<commit_message>
changing 2.0 to 2.1, 2.x or just 2 as appropriate
</commit_message>
<xml_diff>
--- a/images/format-comparison.pptx
+++ b/images/format-comparison.pptx
@@ -1,6 +1,6 @@
 
 <file path=ppt/presentation.xml><?xml version="1.0" encoding="utf-8"?>
-<p:presentation xmlns:a="http://schemas.openxmlformats.org/drawingml/2006/main" xmlns:r="http://schemas.openxmlformats.org/officeDocument/2006/relationships" xmlns:mc="http://schemas.openxmlformats.org/markup-compatibility/2006" xmlns:mv="urn:schemas-microsoft-com:mac:vml" xmlns:p="http://schemas.openxmlformats.org/presentationml/2006/main" mc:Ignorable="mv" mc:PreserveAttributes="mv:*" saveSubsetFonts="1" autoCompressPictures="0">
+<p:presentation xmlns:a="http://schemas.openxmlformats.org/drawingml/2006/main" xmlns:r="http://schemas.openxmlformats.org/officeDocument/2006/relationships" xmlns:p="http://schemas.openxmlformats.org/presentationml/2006/main" saveSubsetFonts="1" autoCompressPictures="0">
   <p:sldMasterIdLst>
     <p:sldMasterId id="2147483648" r:id="rId1"/>
   </p:sldMasterIdLst>
@@ -108,7 +108,7 @@
 </file>
 
 <file path=ppt/slideLayouts/slideLayout1.xml><?xml version="1.0" encoding="utf-8"?>
-<p:sldLayout xmlns:a="http://schemas.openxmlformats.org/drawingml/2006/main" xmlns:r="http://schemas.openxmlformats.org/officeDocument/2006/relationships" xmlns:mc="http://schemas.openxmlformats.org/markup-compatibility/2006" xmlns:mv="urn:schemas-microsoft-com:mac:vml" xmlns:p="http://schemas.openxmlformats.org/presentationml/2006/main" mc:Ignorable="mv" mc:PreserveAttributes="mv:*" type="title" preserve="1">
+<p:sldLayout xmlns:a="http://schemas.openxmlformats.org/drawingml/2006/main" xmlns:r="http://schemas.openxmlformats.org/officeDocument/2006/relationships" xmlns:p="http://schemas.openxmlformats.org/presentationml/2006/main" type="title" preserve="1">
   <p:cSld name="Title Slide">
     <p:spTree>
       <p:nvGrpSpPr>
@@ -285,7 +285,7 @@
           <a:lstStyle/>
           <a:p>
             <a:fld id="{6548C025-F790-9C45-9580-9679861F61E8}" type="datetimeFigureOut">
-              <a:t>6/2/15</a:t>
+              <a:t>10/22/16</a:t>
             </a:fld>
             <a:endParaRPr lang="en-US"/>
           </a:p>
@@ -341,7 +341,7 @@
 </file>
 
 <file path=ppt/slideLayouts/slideLayout10.xml><?xml version="1.0" encoding="utf-8"?>
-<p:sldLayout xmlns:a="http://schemas.openxmlformats.org/drawingml/2006/main" xmlns:r="http://schemas.openxmlformats.org/officeDocument/2006/relationships" xmlns:mc="http://schemas.openxmlformats.org/markup-compatibility/2006" xmlns:mv="urn:schemas-microsoft-com:mac:vml" xmlns:p="http://schemas.openxmlformats.org/presentationml/2006/main" mc:Ignorable="mv" mc:PreserveAttributes="mv:*" type="vertTx" preserve="1">
+<p:sldLayout xmlns:a="http://schemas.openxmlformats.org/drawingml/2006/main" xmlns:r="http://schemas.openxmlformats.org/officeDocument/2006/relationships" xmlns:p="http://schemas.openxmlformats.org/presentationml/2006/main" type="vertTx" preserve="1">
   <p:cSld name="Title and Vertical Text">
     <p:spTree>
       <p:nvGrpSpPr>
@@ -446,7 +446,7 @@
           <a:lstStyle/>
           <a:p>
             <a:fld id="{6548C025-F790-9C45-9580-9679861F61E8}" type="datetimeFigureOut">
-              <a:t>6/2/15</a:t>
+              <a:t>10/22/16</a:t>
             </a:fld>
             <a:endParaRPr lang="en-US"/>
           </a:p>
@@ -502,7 +502,7 @@
 </file>
 
 <file path=ppt/slideLayouts/slideLayout11.xml><?xml version="1.0" encoding="utf-8"?>
-<p:sldLayout xmlns:a="http://schemas.openxmlformats.org/drawingml/2006/main" xmlns:r="http://schemas.openxmlformats.org/officeDocument/2006/relationships" xmlns:mc="http://schemas.openxmlformats.org/markup-compatibility/2006" xmlns:mv="urn:schemas-microsoft-com:mac:vml" xmlns:p="http://schemas.openxmlformats.org/presentationml/2006/main" mc:Ignorable="mv" mc:PreserveAttributes="mv:*" type="vertTitleAndTx" preserve="1">
+<p:sldLayout xmlns:a="http://schemas.openxmlformats.org/drawingml/2006/main" xmlns:r="http://schemas.openxmlformats.org/officeDocument/2006/relationships" xmlns:p="http://schemas.openxmlformats.org/presentationml/2006/main" type="vertTitleAndTx" preserve="1">
   <p:cSld name="Vertical Title and Text">
     <p:spTree>
       <p:nvGrpSpPr>
@@ -617,7 +617,7 @@
           <a:lstStyle/>
           <a:p>
             <a:fld id="{6548C025-F790-9C45-9580-9679861F61E8}" type="datetimeFigureOut">
-              <a:t>6/2/15</a:t>
+              <a:t>10/22/16</a:t>
             </a:fld>
             <a:endParaRPr lang="en-US"/>
           </a:p>
@@ -673,7 +673,7 @@
 </file>
 
 <file path=ppt/slideLayouts/slideLayout2.xml><?xml version="1.0" encoding="utf-8"?>
-<p:sldLayout xmlns:a="http://schemas.openxmlformats.org/drawingml/2006/main" xmlns:r="http://schemas.openxmlformats.org/officeDocument/2006/relationships" xmlns:mc="http://schemas.openxmlformats.org/markup-compatibility/2006" xmlns:mv="urn:schemas-microsoft-com:mac:vml" xmlns:p="http://schemas.openxmlformats.org/presentationml/2006/main" mc:Ignorable="mv" mc:PreserveAttributes="mv:*" type="obj" preserve="1">
+<p:sldLayout xmlns:a="http://schemas.openxmlformats.org/drawingml/2006/main" xmlns:r="http://schemas.openxmlformats.org/officeDocument/2006/relationships" xmlns:p="http://schemas.openxmlformats.org/presentationml/2006/main" type="obj" preserve="1">
   <p:cSld name="Title and Content">
     <p:spTree>
       <p:nvGrpSpPr>
@@ -778,7 +778,7 @@
           <a:lstStyle/>
           <a:p>
             <a:fld id="{6548C025-F790-9C45-9580-9679861F61E8}" type="datetimeFigureOut">
-              <a:t>6/2/15</a:t>
+              <a:t>10/22/16</a:t>
             </a:fld>
             <a:endParaRPr lang="en-US"/>
           </a:p>
@@ -834,7 +834,7 @@
 </file>
 
 <file path=ppt/slideLayouts/slideLayout3.xml><?xml version="1.0" encoding="utf-8"?>
-<p:sldLayout xmlns:a="http://schemas.openxmlformats.org/drawingml/2006/main" xmlns:r="http://schemas.openxmlformats.org/officeDocument/2006/relationships" xmlns:mc="http://schemas.openxmlformats.org/markup-compatibility/2006" xmlns:mv="urn:schemas-microsoft-com:mac:vml" xmlns:p="http://schemas.openxmlformats.org/presentationml/2006/main" mc:Ignorable="mv" mc:PreserveAttributes="mv:*" type="secHead" preserve="1">
+<p:sldLayout xmlns:a="http://schemas.openxmlformats.org/drawingml/2006/main" xmlns:r="http://schemas.openxmlformats.org/officeDocument/2006/relationships" xmlns:p="http://schemas.openxmlformats.org/presentationml/2006/main" type="secHead" preserve="1">
   <p:cSld name="Section Header">
     <p:spTree>
       <p:nvGrpSpPr>
@@ -1016,7 +1016,7 @@
           <a:lstStyle/>
           <a:p>
             <a:fld id="{6548C025-F790-9C45-9580-9679861F61E8}" type="datetimeFigureOut">
-              <a:t>6/2/15</a:t>
+              <a:t>10/22/16</a:t>
             </a:fld>
             <a:endParaRPr lang="en-US"/>
           </a:p>
@@ -1072,7 +1072,7 @@
 </file>
 
 <file path=ppt/slideLayouts/slideLayout4.xml><?xml version="1.0" encoding="utf-8"?>
-<p:sldLayout xmlns:a="http://schemas.openxmlformats.org/drawingml/2006/main" xmlns:r="http://schemas.openxmlformats.org/officeDocument/2006/relationships" xmlns:mc="http://schemas.openxmlformats.org/markup-compatibility/2006" xmlns:mv="urn:schemas-microsoft-com:mac:vml" xmlns:p="http://schemas.openxmlformats.org/presentationml/2006/main" mc:Ignorable="mv" mc:PreserveAttributes="mv:*" type="twoObj" preserve="1">
+<p:sldLayout xmlns:a="http://schemas.openxmlformats.org/drawingml/2006/main" xmlns:r="http://schemas.openxmlformats.org/officeDocument/2006/relationships" xmlns:p="http://schemas.openxmlformats.org/presentationml/2006/main" type="twoObj" preserve="1">
   <p:cSld name="Two Content">
     <p:spTree>
       <p:nvGrpSpPr>
@@ -1294,7 +1294,7 @@
           <a:lstStyle/>
           <a:p>
             <a:fld id="{6548C025-F790-9C45-9580-9679861F61E8}" type="datetimeFigureOut">
-              <a:t>6/2/15</a:t>
+              <a:t>10/22/16</a:t>
             </a:fld>
             <a:endParaRPr lang="en-US"/>
           </a:p>
@@ -1350,7 +1350,7 @@
 </file>
 
 <file path=ppt/slideLayouts/slideLayout5.xml><?xml version="1.0" encoding="utf-8"?>
-<p:sldLayout xmlns:a="http://schemas.openxmlformats.org/drawingml/2006/main" xmlns:r="http://schemas.openxmlformats.org/officeDocument/2006/relationships" xmlns:mc="http://schemas.openxmlformats.org/markup-compatibility/2006" xmlns:mv="urn:schemas-microsoft-com:mac:vml" xmlns:p="http://schemas.openxmlformats.org/presentationml/2006/main" mc:Ignorable="mv" mc:PreserveAttributes="mv:*" type="twoTxTwoObj" preserve="1">
+<p:sldLayout xmlns:a="http://schemas.openxmlformats.org/drawingml/2006/main" xmlns:r="http://schemas.openxmlformats.org/officeDocument/2006/relationships" xmlns:p="http://schemas.openxmlformats.org/presentationml/2006/main" type="twoTxTwoObj" preserve="1">
   <p:cSld name="Comparison">
     <p:spTree>
       <p:nvGrpSpPr>
@@ -1706,7 +1706,7 @@
           <a:lstStyle/>
           <a:p>
             <a:fld id="{6548C025-F790-9C45-9580-9679861F61E8}" type="datetimeFigureOut">
-              <a:t>6/2/15</a:t>
+              <a:t>10/22/16</a:t>
             </a:fld>
             <a:endParaRPr lang="en-US"/>
           </a:p>
@@ -1762,7 +1762,7 @@
 </file>
 
 <file path=ppt/slideLayouts/slideLayout6.xml><?xml version="1.0" encoding="utf-8"?>
-<p:sldLayout xmlns:a="http://schemas.openxmlformats.org/drawingml/2006/main" xmlns:r="http://schemas.openxmlformats.org/officeDocument/2006/relationships" xmlns:mc="http://schemas.openxmlformats.org/markup-compatibility/2006" xmlns:mv="urn:schemas-microsoft-com:mac:vml" xmlns:p="http://schemas.openxmlformats.org/presentationml/2006/main" mc:Ignorable="mv" mc:PreserveAttributes="mv:*" type="titleOnly" preserve="1">
+<p:sldLayout xmlns:a="http://schemas.openxmlformats.org/drawingml/2006/main" xmlns:r="http://schemas.openxmlformats.org/officeDocument/2006/relationships" xmlns:p="http://schemas.openxmlformats.org/presentationml/2006/main" type="titleOnly" preserve="1">
   <p:cSld name="Title Only">
     <p:spTree>
       <p:nvGrpSpPr>
@@ -1816,7 +1816,7 @@
           <a:lstStyle/>
           <a:p>
             <a:fld id="{6548C025-F790-9C45-9580-9679861F61E8}" type="datetimeFigureOut">
-              <a:t>6/2/15</a:t>
+              <a:t>10/22/16</a:t>
             </a:fld>
             <a:endParaRPr lang="en-US"/>
           </a:p>
@@ -1872,7 +1872,7 @@
 </file>
 
 <file path=ppt/slideLayouts/slideLayout7.xml><?xml version="1.0" encoding="utf-8"?>
-<p:sldLayout xmlns:a="http://schemas.openxmlformats.org/drawingml/2006/main" xmlns:r="http://schemas.openxmlformats.org/officeDocument/2006/relationships" xmlns:mc="http://schemas.openxmlformats.org/markup-compatibility/2006" xmlns:mv="urn:schemas-microsoft-com:mac:vml" xmlns:p="http://schemas.openxmlformats.org/presentationml/2006/main" mc:Ignorable="mv" mc:PreserveAttributes="mv:*" type="blank" preserve="1">
+<p:sldLayout xmlns:a="http://schemas.openxmlformats.org/drawingml/2006/main" xmlns:r="http://schemas.openxmlformats.org/officeDocument/2006/relationships" xmlns:p="http://schemas.openxmlformats.org/presentationml/2006/main" type="blank" preserve="1">
   <p:cSld name="Blank">
     <p:spTree>
       <p:nvGrpSpPr>
@@ -1904,7 +1904,7 @@
           <a:lstStyle/>
           <a:p>
             <a:fld id="{6548C025-F790-9C45-9580-9679861F61E8}" type="datetimeFigureOut">
-              <a:t>6/2/15</a:t>
+              <a:t>10/22/16</a:t>
             </a:fld>
             <a:endParaRPr lang="en-US"/>
           </a:p>
@@ -1960,7 +1960,7 @@
 </file>
 
 <file path=ppt/slideLayouts/slideLayout8.xml><?xml version="1.0" encoding="utf-8"?>
-<p:sldLayout xmlns:a="http://schemas.openxmlformats.org/drawingml/2006/main" xmlns:r="http://schemas.openxmlformats.org/officeDocument/2006/relationships" xmlns:mc="http://schemas.openxmlformats.org/markup-compatibility/2006" xmlns:mv="urn:schemas-microsoft-com:mac:vml" xmlns:p="http://schemas.openxmlformats.org/presentationml/2006/main" mc:Ignorable="mv" mc:PreserveAttributes="mv:*" type="objTx" preserve="1">
+<p:sldLayout xmlns:a="http://schemas.openxmlformats.org/drawingml/2006/main" xmlns:r="http://schemas.openxmlformats.org/officeDocument/2006/relationships" xmlns:p="http://schemas.openxmlformats.org/presentationml/2006/main" type="objTx" preserve="1">
   <p:cSld name="Content with Caption">
     <p:spTree>
       <p:nvGrpSpPr>
@@ -2172,7 +2172,7 @@
           <a:lstStyle/>
           <a:p>
             <a:fld id="{6548C025-F790-9C45-9580-9679861F61E8}" type="datetimeFigureOut">
-              <a:t>6/2/15</a:t>
+              <a:t>10/22/16</a:t>
             </a:fld>
             <a:endParaRPr lang="en-US"/>
           </a:p>
@@ -2228,7 +2228,7 @@
 </file>
 
 <file path=ppt/slideLayouts/slideLayout9.xml><?xml version="1.0" encoding="utf-8"?>
-<p:sldLayout xmlns:a="http://schemas.openxmlformats.org/drawingml/2006/main" xmlns:r="http://schemas.openxmlformats.org/officeDocument/2006/relationships" xmlns:mc="http://schemas.openxmlformats.org/markup-compatibility/2006" xmlns:mv="urn:schemas-microsoft-com:mac:vml" xmlns:p="http://schemas.openxmlformats.org/presentationml/2006/main" mc:Ignorable="mv" mc:PreserveAttributes="mv:*" type="picTx" preserve="1">
+<p:sldLayout xmlns:a="http://schemas.openxmlformats.org/drawingml/2006/main" xmlns:r="http://schemas.openxmlformats.org/officeDocument/2006/relationships" xmlns:p="http://schemas.openxmlformats.org/presentationml/2006/main" type="picTx" preserve="1">
   <p:cSld name="Picture with Caption">
     <p:spTree>
       <p:nvGrpSpPr>
@@ -2417,7 +2417,7 @@
           <a:lstStyle/>
           <a:p>
             <a:fld id="{6548C025-F790-9C45-9580-9679861F61E8}" type="datetimeFigureOut">
-              <a:t>6/2/15</a:t>
+              <a:t>10/22/16</a:t>
             </a:fld>
             <a:endParaRPr lang="en-US"/>
           </a:p>
@@ -2473,7 +2473,7 @@
 </file>
 
 <file path=ppt/slideMasters/slideMaster1.xml><?xml version="1.0" encoding="utf-8"?>
-<p:sldMaster xmlns:a="http://schemas.openxmlformats.org/drawingml/2006/main" xmlns:r="http://schemas.openxmlformats.org/officeDocument/2006/relationships" xmlns:mc="http://schemas.openxmlformats.org/markup-compatibility/2006" xmlns:mv="urn:schemas-microsoft-com:mac:vml" xmlns:p="http://schemas.openxmlformats.org/presentationml/2006/main" mc:Ignorable="mv" mc:PreserveAttributes="mv:*">
+<p:sldMaster xmlns:a="http://schemas.openxmlformats.org/drawingml/2006/main" xmlns:r="http://schemas.openxmlformats.org/officeDocument/2006/relationships" xmlns:p="http://schemas.openxmlformats.org/presentationml/2006/main">
   <p:cSld>
     <p:bg>
       <p:bgRef idx="1001">
@@ -2621,7 +2621,7 @@
           </a:lstStyle>
           <a:p>
             <a:fld id="{6548C025-F790-9C45-9580-9679861F61E8}" type="datetimeFigureOut">
-              <a:t>6/2/15</a:t>
+              <a:t>10/22/16</a:t>
             </a:fld>
             <a:endParaRPr lang="en-US"/>
           </a:p>
@@ -2974,7 +2974,7 @@
 </file>
 
 <file path=ppt/slides/slide1.xml><?xml version="1.0" encoding="utf-8"?>
-<p:sld xmlns:a="http://schemas.openxmlformats.org/drawingml/2006/main" xmlns:r="http://schemas.openxmlformats.org/officeDocument/2006/relationships" xmlns:mc="http://schemas.openxmlformats.org/markup-compatibility/2006" xmlns:mv="urn:schemas-microsoft-com:mac:vml" xmlns:p="http://schemas.openxmlformats.org/presentationml/2006/main" mc:Ignorable="mv" mc:PreserveAttributes="mv:*">
+<p:sld xmlns:a="http://schemas.openxmlformats.org/drawingml/2006/main" xmlns:r="http://schemas.openxmlformats.org/officeDocument/2006/relationships" xmlns:p="http://schemas.openxmlformats.org/presentationml/2006/main">
   <p:cSld>
     <p:spTree>
       <p:nvGrpSpPr>
@@ -3133,8 +3133,21 @@
                   <a:srgbClr val="0000FF"/>
                 </a:solidFill>
               </a:rPr>
-              <a:t>SBOL 1.1</a:t>
-            </a:r>
+              <a:t>SBOL 1</a:t>
+            </a:r>
+            <a:r>
+              <a:rPr lang="en-US" b="1" dirty="0" smtClean="0">
+                <a:solidFill>
+                  <a:srgbClr val="0000FF"/>
+                </a:solidFill>
+              </a:rPr>
+              <a:t>.x</a:t>
+            </a:r>
+            <a:endParaRPr lang="en-US" b="1" dirty="0" smtClean="0">
+              <a:solidFill>
+                <a:srgbClr val="0000FF"/>
+              </a:solidFill>
+            </a:endParaRPr>
           </a:p>
           <a:p>
             <a:pPr>
@@ -3175,7 +3188,15 @@
                   <a:srgbClr val="0000FF"/>
                 </a:solidFill>
               </a:rPr>
-              <a:t>SBOL 2.0</a:t>
+              <a:t>SBOL 2</a:t>
+            </a:r>
+            <a:r>
+              <a:rPr lang="en-US" b="1" dirty="0" smtClean="0">
+                <a:solidFill>
+                  <a:srgbClr val="0000FF"/>
+                </a:solidFill>
+              </a:rPr>
+              <a:t>.x</a:t>
             </a:r>
             <a:endParaRPr lang="en-US" b="1" dirty="0" smtClean="0">
               <a:solidFill>

</xml_diff>